<commit_message>
updated tech review slides
</commit_message>
<xml_diff>
--- a/doc/WeReadTheNews.pptx
+++ b/doc/WeReadTheNews.pptx
@@ -5,7 +5,7 @@
     <p:sldMasterId id="2147483648" r:id="rId1"/>
   </p:sldMasterIdLst>
   <p:notesMasterIdLst>
-    <p:notesMasterId r:id="rId7"/>
+    <p:notesMasterId r:id="rId9"/>
   </p:notesMasterIdLst>
   <p:sldIdLst>
     <p:sldId id="256" r:id="rId2"/>
@@ -13,6 +13,8 @@
     <p:sldId id="1806" r:id="rId4"/>
     <p:sldId id="1808" r:id="rId5"/>
     <p:sldId id="1809" r:id="rId6"/>
+    <p:sldId id="1812" r:id="rId7"/>
+    <p:sldId id="1814" r:id="rId8"/>
   </p:sldIdLst>
   <p:sldSz cx="12192000" cy="6858000"/>
   <p:notesSz cx="6858000" cy="9144000"/>
@@ -786,6 +788,174 @@
             <a:fld id="{AF7CA6D5-71D9-4D77-8733-A082675BD640}" type="slidenum">
               <a:rPr lang="en-US" smtClean="0"/>
               <a:t>5</a:t>
+            </a:fld>
+            <a:endParaRPr lang="en-US"/>
+          </a:p>
+        </p:txBody>
+      </p:sp>
+    </p:spTree>
+    <p:extLst>
+      <p:ext uri="{BB962C8B-B14F-4D97-AF65-F5344CB8AC3E}">
+        <p14:creationId xmlns:p14="http://schemas.microsoft.com/office/powerpoint/2010/main" val="2796515739"/>
+      </p:ext>
+    </p:extLst>
+  </p:cSld>
+  <p:clrMapOvr>
+    <a:masterClrMapping/>
+  </p:clrMapOvr>
+</p:notes>
+</file>
+
+<file path=ppt/notesSlides/notesSlide5.xml><?xml version="1.0" encoding="utf-8"?>
+<p:notes xmlns:a="http://schemas.openxmlformats.org/drawingml/2006/main" xmlns:r="http://schemas.openxmlformats.org/officeDocument/2006/relationships" xmlns:p="http://schemas.openxmlformats.org/presentationml/2006/main">
+  <p:cSld>
+    <p:spTree>
+      <p:nvGrpSpPr>
+        <p:cNvPr id="1" name=""/>
+        <p:cNvGrpSpPr/>
+        <p:nvPr/>
+      </p:nvGrpSpPr>
+      <p:grpSpPr>
+        <a:xfrm>
+          <a:off x="0" y="0"/>
+          <a:ext cx="0" cy="0"/>
+          <a:chOff x="0" y="0"/>
+          <a:chExt cx="0" cy="0"/>
+        </a:xfrm>
+      </p:grpSpPr>
+      <p:sp>
+        <p:nvSpPr>
+          <p:cNvPr id="2" name="Slide Image Placeholder 1"/>
+          <p:cNvSpPr>
+            <a:spLocks noGrp="1" noRot="1" noChangeAspect="1"/>
+          </p:cNvSpPr>
+          <p:nvPr>
+            <p:ph type="sldImg"/>
+          </p:nvPr>
+        </p:nvSpPr>
+        <p:spPr/>
+      </p:sp>
+      <p:sp>
+        <p:nvSpPr>
+          <p:cNvPr id="3" name="Notes Placeholder 2"/>
+          <p:cNvSpPr>
+            <a:spLocks noGrp="1"/>
+          </p:cNvSpPr>
+          <p:nvPr>
+            <p:ph type="body" idx="1"/>
+          </p:nvPr>
+        </p:nvSpPr>
+        <p:spPr/>
+        <p:txBody>
+          <a:bodyPr/>
+          <a:lstStyle/>
+          <a:p>
+            <a:endParaRPr lang="en-US"/>
+          </a:p>
+        </p:txBody>
+      </p:sp>
+      <p:sp>
+        <p:nvSpPr>
+          <p:cNvPr id="4" name="Slide Number Placeholder 3"/>
+          <p:cNvSpPr>
+            <a:spLocks noGrp="1"/>
+          </p:cNvSpPr>
+          <p:nvPr>
+            <p:ph type="sldNum" sz="quarter" idx="10"/>
+          </p:nvPr>
+        </p:nvSpPr>
+        <p:spPr/>
+        <p:txBody>
+          <a:bodyPr/>
+          <a:lstStyle/>
+          <a:p>
+            <a:fld id="{AF7CA6D5-71D9-4D77-8733-A082675BD640}" type="slidenum">
+              <a:rPr lang="en-US" smtClean="0"/>
+              <a:t>6</a:t>
+            </a:fld>
+            <a:endParaRPr lang="en-US"/>
+          </a:p>
+        </p:txBody>
+      </p:sp>
+    </p:spTree>
+    <p:extLst>
+      <p:ext uri="{BB962C8B-B14F-4D97-AF65-F5344CB8AC3E}">
+        <p14:creationId xmlns:p14="http://schemas.microsoft.com/office/powerpoint/2010/main" val="2796515739"/>
+      </p:ext>
+    </p:extLst>
+  </p:cSld>
+  <p:clrMapOvr>
+    <a:masterClrMapping/>
+  </p:clrMapOvr>
+</p:notes>
+</file>
+
+<file path=ppt/notesSlides/notesSlide6.xml><?xml version="1.0" encoding="utf-8"?>
+<p:notes xmlns:a="http://schemas.openxmlformats.org/drawingml/2006/main" xmlns:r="http://schemas.openxmlformats.org/officeDocument/2006/relationships" xmlns:p="http://schemas.openxmlformats.org/presentationml/2006/main">
+  <p:cSld>
+    <p:spTree>
+      <p:nvGrpSpPr>
+        <p:cNvPr id="1" name=""/>
+        <p:cNvGrpSpPr/>
+        <p:nvPr/>
+      </p:nvGrpSpPr>
+      <p:grpSpPr>
+        <a:xfrm>
+          <a:off x="0" y="0"/>
+          <a:ext cx="0" cy="0"/>
+          <a:chOff x="0" y="0"/>
+          <a:chExt cx="0" cy="0"/>
+        </a:xfrm>
+      </p:grpSpPr>
+      <p:sp>
+        <p:nvSpPr>
+          <p:cNvPr id="2" name="Slide Image Placeholder 1"/>
+          <p:cNvSpPr>
+            <a:spLocks noGrp="1" noRot="1" noChangeAspect="1"/>
+          </p:cNvSpPr>
+          <p:nvPr>
+            <p:ph type="sldImg"/>
+          </p:nvPr>
+        </p:nvSpPr>
+        <p:spPr/>
+      </p:sp>
+      <p:sp>
+        <p:nvSpPr>
+          <p:cNvPr id="3" name="Notes Placeholder 2"/>
+          <p:cNvSpPr>
+            <a:spLocks noGrp="1"/>
+          </p:cNvSpPr>
+          <p:nvPr>
+            <p:ph type="body" idx="1"/>
+          </p:nvPr>
+        </p:nvSpPr>
+        <p:spPr/>
+        <p:txBody>
+          <a:bodyPr/>
+          <a:lstStyle/>
+          <a:p>
+            <a:endParaRPr lang="en-US"/>
+          </a:p>
+        </p:txBody>
+      </p:sp>
+      <p:sp>
+        <p:nvSpPr>
+          <p:cNvPr id="4" name="Slide Number Placeholder 3"/>
+          <p:cNvSpPr>
+            <a:spLocks noGrp="1"/>
+          </p:cNvSpPr>
+          <p:nvPr>
+            <p:ph type="sldNum" sz="quarter" idx="10"/>
+          </p:nvPr>
+        </p:nvSpPr>
+        <p:spPr/>
+        <p:txBody>
+          <a:bodyPr/>
+          <a:lstStyle/>
+          <a:p>
+            <a:fld id="{AF7CA6D5-71D9-4D77-8733-A082675BD640}" type="slidenum">
+              <a:rPr lang="en-US" smtClean="0"/>
+              <a:t>7</a:t>
             </a:fld>
             <a:endParaRPr lang="en-US"/>
           </a:p>
@@ -4410,7 +4580,7 @@
           <a:p>
             <a:pPr algn="r"/>
             <a:r>
-              <a:rPr lang="en-US" sz="5400">
+              <a:rPr lang="en-US" sz="5400" dirty="0">
                 <a:solidFill>
                   <a:srgbClr val="FFFFFF"/>
                 </a:solidFill>
@@ -4418,7 +4588,7 @@
               <a:t>News </a:t>
             </a:r>
             <a:r>
-              <a:rPr lang="en-US" sz="5400" smtClean="0">
+              <a:rPr lang="en-US" sz="5400" dirty="0" smtClean="0">
                 <a:solidFill>
                   <a:srgbClr val="FFFFFF"/>
                 </a:solidFill>
@@ -5455,8 +5625,8 @@
         </p:nvSpPr>
         <p:spPr>
           <a:xfrm>
-            <a:off x="838200" y="1381125"/>
-            <a:ext cx="10515600" cy="5175602"/>
+            <a:off x="838200" y="992235"/>
+            <a:ext cx="10515600" cy="5564492"/>
           </a:xfrm>
           <a:prstGeom prst="rect">
             <a:avLst/>
@@ -5671,9 +5841,43 @@
             <a:pPr lvl="2"/>
             <a:r>
               <a:rPr lang="en-US" sz="2400" i="1" dirty="0" smtClean="0"/>
-              <a:t>Words to topic relation</a:t>
-            </a:r>
-            <a:endParaRPr lang="en-US" sz="2400" dirty="0"/>
+              <a:t>Words to topic </a:t>
+            </a:r>
+            <a:r>
+              <a:rPr lang="en-US" sz="2400" i="1" dirty="0" smtClean="0"/>
+              <a:t>relation</a:t>
+            </a:r>
+            <a:endParaRPr lang="en-US" sz="2400" i="1" dirty="0"/>
+          </a:p>
+          <a:p>
+            <a:r>
+              <a:rPr lang="en-US" dirty="0" smtClean="0"/>
+              <a:t>Multi-layered Topic Modeling</a:t>
+            </a:r>
+          </a:p>
+          <a:p>
+            <a:pPr lvl="1"/>
+            <a:r>
+              <a:rPr lang="en-US" dirty="0" smtClean="0"/>
+              <a:t>We want to model high level topics such as politics, science, entertainment, </a:t>
+            </a:r>
+            <a:r>
+              <a:rPr lang="en-US" dirty="0" err="1" smtClean="0"/>
+              <a:t>etc</a:t>
+            </a:r>
+            <a:endParaRPr lang="en-US" dirty="0" smtClean="0"/>
+          </a:p>
+          <a:p>
+            <a:pPr lvl="1"/>
+            <a:r>
+              <a:rPr lang="en-US" dirty="0" smtClean="0"/>
+              <a:t>We also want to model more specific sub-topics: Russia investigation, healthcare reform, </a:t>
+            </a:r>
+            <a:r>
+              <a:rPr lang="en-US" dirty="0" err="1" smtClean="0"/>
+              <a:t>etc</a:t>
+            </a:r>
+            <a:endParaRPr lang="en-US" dirty="0"/>
           </a:p>
           <a:p>
             <a:r>
@@ -5702,26 +5906,6 @@
           <a:p>
             <a:pPr lvl="1"/>
             <a:endParaRPr lang="en-US" dirty="0"/>
-          </a:p>
-          <a:p>
-            <a:r>
-              <a:rPr lang="en-US" dirty="0"/>
-              <a:t>Solution = Guided LDA</a:t>
-            </a:r>
-          </a:p>
-          <a:p>
-            <a:pPr lvl="1"/>
-            <a:r>
-              <a:rPr lang="en-US" dirty="0"/>
-              <a:t>“seed” interpretable topics to “guide” the LDA algorithm</a:t>
-            </a:r>
-          </a:p>
-          <a:p>
-            <a:pPr lvl="1"/>
-            <a:r>
-              <a:rPr lang="en-US" dirty="0"/>
-              <a:t>Semi-supervised model</a:t>
-            </a:r>
           </a:p>
           <a:p>
             <a:pPr lvl="1"/>
@@ -6124,6 +6308,709 @@
     <p:extLst>
       <p:ext uri="{BB962C8B-B14F-4D97-AF65-F5344CB8AC3E}">
         <p14:creationId xmlns:p14="http://schemas.microsoft.com/office/powerpoint/2010/main" val="3103811329"/>
+      </p:ext>
+    </p:extLst>
+  </p:cSld>
+  <p:clrMapOvr>
+    <a:masterClrMapping/>
+  </p:clrMapOvr>
+  <p:transition xmlns:p14="http://schemas.microsoft.com/office/powerpoint/2010/main">
+    <p:fade/>
+  </p:transition>
+  <p:timing>
+    <p:tnLst>
+      <p:par>
+        <p:cTn xmlns:p14="http://schemas.microsoft.com/office/powerpoint/2010/main" id="1" dur="indefinite" restart="never" nodeType="tmRoot"/>
+      </p:par>
+    </p:tnLst>
+  </p:timing>
+</p:sld>
+</file>
+
+<file path=ppt/slides/slide6.xml><?xml version="1.0" encoding="utf-8"?>
+<p:sld xmlns:a="http://schemas.openxmlformats.org/drawingml/2006/main" xmlns:r="http://schemas.openxmlformats.org/officeDocument/2006/relationships" xmlns:p="http://schemas.openxmlformats.org/presentationml/2006/main">
+  <p:cSld>
+    <p:spTree>
+      <p:nvGrpSpPr>
+        <p:cNvPr id="1" name=""/>
+        <p:cNvGrpSpPr/>
+        <p:nvPr/>
+      </p:nvGrpSpPr>
+      <p:grpSpPr>
+        <a:xfrm>
+          <a:off x="0" y="0"/>
+          <a:ext cx="0" cy="0"/>
+          <a:chOff x="0" y="0"/>
+          <a:chExt cx="0" cy="0"/>
+        </a:xfrm>
+      </p:grpSpPr>
+      <p:sp>
+        <p:nvSpPr>
+          <p:cNvPr id="2" name="Title 1">
+            <a:extLst>
+              <a:ext uri="{FF2B5EF4-FFF2-40B4-BE49-F238E27FC236}">
+                <a16:creationId xmlns="" xmlns:a16="http://schemas.microsoft.com/office/drawing/2014/main" id="{1C4D9048-0D5E-42BB-952A-048C2B8BB387}"/>
+              </a:ext>
+            </a:extLst>
+          </p:cNvPr>
+          <p:cNvSpPr>
+            <a:spLocks noGrp="1"/>
+          </p:cNvSpPr>
+          <p:nvPr>
+            <p:ph type="title"/>
+          </p:nvPr>
+        </p:nvSpPr>
+        <p:spPr/>
+        <p:txBody>
+          <a:bodyPr>
+            <a:normAutofit/>
+          </a:bodyPr>
+          <a:lstStyle/>
+          <a:p>
+            <a:r>
+              <a:rPr lang="en-US" dirty="0" err="1" smtClean="0"/>
+              <a:t>Gensim</a:t>
+            </a:r>
+            <a:r>
+              <a:rPr lang="en-US" dirty="0" smtClean="0"/>
+              <a:t> Library</a:t>
+            </a:r>
+            <a:endParaRPr lang="en-US" sz="1400" dirty="0"/>
+          </a:p>
+        </p:txBody>
+      </p:sp>
+      <p:sp>
+        <p:nvSpPr>
+          <p:cNvPr id="3" name="Content Placeholder 2">
+            <a:extLst>
+              <a:ext uri="{FF2B5EF4-FFF2-40B4-BE49-F238E27FC236}">
+                <a16:creationId xmlns="" xmlns:a16="http://schemas.microsoft.com/office/drawing/2014/main" id="{EBA8AB48-5605-4ABB-B1B4-0EE94FAE3EB8}"/>
+              </a:ext>
+            </a:extLst>
+          </p:cNvPr>
+          <p:cNvSpPr txBox="1">
+            <a:spLocks/>
+          </p:cNvSpPr>
+          <p:nvPr/>
+        </p:nvSpPr>
+        <p:spPr>
+          <a:xfrm>
+            <a:off x="838200" y="1182157"/>
+            <a:ext cx="10515600" cy="5252510"/>
+          </a:xfrm>
+          <a:prstGeom prst="rect">
+            <a:avLst/>
+          </a:prstGeom>
+        </p:spPr>
+        <p:txBody>
+          <a:bodyPr/>
+          <a:lstStyle>
+            <a:lvl1pPr marL="228600" indent="-228600" algn="l" defTabSz="914400" rtl="0" eaLnBrk="1" latinLnBrk="0" hangingPunct="1">
+              <a:lnSpc>
+                <a:spcPct val="90000"/>
+              </a:lnSpc>
+              <a:spcBef>
+                <a:spcPts val="1000"/>
+              </a:spcBef>
+              <a:buFont typeface="Arial" panose="020B0604020202020204" pitchFamily="34" charset="0"/>
+              <a:buChar char="•"/>
+              <a:defRPr sz="2800" kern="1200">
+                <a:solidFill>
+                  <a:schemeClr val="tx1"/>
+                </a:solidFill>
+                <a:latin typeface="+mn-lt"/>
+                <a:ea typeface="+mn-ea"/>
+                <a:cs typeface="+mn-cs"/>
+              </a:defRPr>
+            </a:lvl1pPr>
+            <a:lvl2pPr marL="685800" indent="-228600" algn="l" defTabSz="914400" rtl="0" eaLnBrk="1" latinLnBrk="0" hangingPunct="1">
+              <a:lnSpc>
+                <a:spcPct val="90000"/>
+              </a:lnSpc>
+              <a:spcBef>
+                <a:spcPts val="500"/>
+              </a:spcBef>
+              <a:buFont typeface="Arial" panose="020B0604020202020204" pitchFamily="34" charset="0"/>
+              <a:buChar char="•"/>
+              <a:defRPr sz="2400" kern="1200">
+                <a:solidFill>
+                  <a:schemeClr val="tx1"/>
+                </a:solidFill>
+                <a:latin typeface="+mn-lt"/>
+                <a:ea typeface="+mn-ea"/>
+                <a:cs typeface="+mn-cs"/>
+              </a:defRPr>
+            </a:lvl2pPr>
+            <a:lvl3pPr marL="1143000" indent="-228600" algn="l" defTabSz="914400" rtl="0" eaLnBrk="1" latinLnBrk="0" hangingPunct="1">
+              <a:lnSpc>
+                <a:spcPct val="90000"/>
+              </a:lnSpc>
+              <a:spcBef>
+                <a:spcPts val="500"/>
+              </a:spcBef>
+              <a:buFont typeface="Arial" panose="020B0604020202020204" pitchFamily="34" charset="0"/>
+              <a:buChar char="•"/>
+              <a:defRPr sz="2000" kern="1200">
+                <a:solidFill>
+                  <a:schemeClr val="tx1"/>
+                </a:solidFill>
+                <a:latin typeface="+mn-lt"/>
+                <a:ea typeface="+mn-ea"/>
+                <a:cs typeface="+mn-cs"/>
+              </a:defRPr>
+            </a:lvl3pPr>
+            <a:lvl4pPr marL="1600200" indent="-228600" algn="l" defTabSz="914400" rtl="0" eaLnBrk="1" latinLnBrk="0" hangingPunct="1">
+              <a:lnSpc>
+                <a:spcPct val="90000"/>
+              </a:lnSpc>
+              <a:spcBef>
+                <a:spcPts val="500"/>
+              </a:spcBef>
+              <a:buFont typeface="Arial" panose="020B0604020202020204" pitchFamily="34" charset="0"/>
+              <a:buChar char="•"/>
+              <a:defRPr sz="1800" kern="1200">
+                <a:solidFill>
+                  <a:schemeClr val="tx1"/>
+                </a:solidFill>
+                <a:latin typeface="+mn-lt"/>
+                <a:ea typeface="+mn-ea"/>
+                <a:cs typeface="+mn-cs"/>
+              </a:defRPr>
+            </a:lvl4pPr>
+            <a:lvl5pPr marL="2057400" indent="-228600" algn="l" defTabSz="914400" rtl="0" eaLnBrk="1" latinLnBrk="0" hangingPunct="1">
+              <a:lnSpc>
+                <a:spcPct val="90000"/>
+              </a:lnSpc>
+              <a:spcBef>
+                <a:spcPts val="500"/>
+              </a:spcBef>
+              <a:buFont typeface="Arial" panose="020B0604020202020204" pitchFamily="34" charset="0"/>
+              <a:buChar char="•"/>
+              <a:defRPr sz="1800" kern="1200">
+                <a:solidFill>
+                  <a:schemeClr val="tx1"/>
+                </a:solidFill>
+                <a:latin typeface="+mn-lt"/>
+                <a:ea typeface="+mn-ea"/>
+                <a:cs typeface="+mn-cs"/>
+              </a:defRPr>
+            </a:lvl5pPr>
+            <a:lvl6pPr marL="2514600" indent="-228600" algn="l" defTabSz="914400" rtl="0" eaLnBrk="1" latinLnBrk="0" hangingPunct="1">
+              <a:lnSpc>
+                <a:spcPct val="90000"/>
+              </a:lnSpc>
+              <a:spcBef>
+                <a:spcPts val="500"/>
+              </a:spcBef>
+              <a:buFont typeface="Arial" panose="020B0604020202020204" pitchFamily="34" charset="0"/>
+              <a:buChar char="•"/>
+              <a:defRPr sz="1800" kern="1200">
+                <a:solidFill>
+                  <a:schemeClr val="tx1"/>
+                </a:solidFill>
+                <a:latin typeface="+mn-lt"/>
+                <a:ea typeface="+mn-ea"/>
+                <a:cs typeface="+mn-cs"/>
+              </a:defRPr>
+            </a:lvl6pPr>
+            <a:lvl7pPr marL="2971800" indent="-228600" algn="l" defTabSz="914400" rtl="0" eaLnBrk="1" latinLnBrk="0" hangingPunct="1">
+              <a:lnSpc>
+                <a:spcPct val="90000"/>
+              </a:lnSpc>
+              <a:spcBef>
+                <a:spcPts val="500"/>
+              </a:spcBef>
+              <a:buFont typeface="Arial" panose="020B0604020202020204" pitchFamily="34" charset="0"/>
+              <a:buChar char="•"/>
+              <a:defRPr sz="1800" kern="1200">
+                <a:solidFill>
+                  <a:schemeClr val="tx1"/>
+                </a:solidFill>
+                <a:latin typeface="+mn-lt"/>
+                <a:ea typeface="+mn-ea"/>
+                <a:cs typeface="+mn-cs"/>
+              </a:defRPr>
+            </a:lvl7pPr>
+            <a:lvl8pPr marL="3429000" indent="-228600" algn="l" defTabSz="914400" rtl="0" eaLnBrk="1" latinLnBrk="0" hangingPunct="1">
+              <a:lnSpc>
+                <a:spcPct val="90000"/>
+              </a:lnSpc>
+              <a:spcBef>
+                <a:spcPts val="500"/>
+              </a:spcBef>
+              <a:buFont typeface="Arial" panose="020B0604020202020204" pitchFamily="34" charset="0"/>
+              <a:buChar char="•"/>
+              <a:defRPr sz="1800" kern="1200">
+                <a:solidFill>
+                  <a:schemeClr val="tx1"/>
+                </a:solidFill>
+                <a:latin typeface="+mn-lt"/>
+                <a:ea typeface="+mn-ea"/>
+                <a:cs typeface="+mn-cs"/>
+              </a:defRPr>
+            </a:lvl8pPr>
+            <a:lvl9pPr marL="3886200" indent="-228600" algn="l" defTabSz="914400" rtl="0" eaLnBrk="1" latinLnBrk="0" hangingPunct="1">
+              <a:lnSpc>
+                <a:spcPct val="90000"/>
+              </a:lnSpc>
+              <a:spcBef>
+                <a:spcPts val="500"/>
+              </a:spcBef>
+              <a:buFont typeface="Arial" panose="020B0604020202020204" pitchFamily="34" charset="0"/>
+              <a:buChar char="•"/>
+              <a:defRPr sz="1800" kern="1200">
+                <a:solidFill>
+                  <a:schemeClr val="tx1"/>
+                </a:solidFill>
+                <a:latin typeface="+mn-lt"/>
+                <a:ea typeface="+mn-ea"/>
+                <a:cs typeface="+mn-cs"/>
+              </a:defRPr>
+            </a:lvl9pPr>
+          </a:lstStyle>
+          <a:p>
+            <a:r>
+              <a:rPr lang="en-US" dirty="0" err="1" smtClean="0"/>
+              <a:t>Gensim</a:t>
+            </a:r>
+            <a:endParaRPr lang="en-US" dirty="0"/>
+          </a:p>
+          <a:p>
+            <a:r>
+              <a:rPr lang="en-US" dirty="0" smtClean="0"/>
+              <a:t>Pros</a:t>
+            </a:r>
+            <a:endParaRPr lang="en-US" dirty="0"/>
+          </a:p>
+          <a:p>
+            <a:pPr lvl="1"/>
+            <a:r>
+              <a:rPr lang="en-US" dirty="0" smtClean="0"/>
+              <a:t>Powerful topic modeling and NLP library</a:t>
+            </a:r>
+          </a:p>
+          <a:p>
+            <a:pPr lvl="2"/>
+            <a:r>
+              <a:rPr lang="en-US" dirty="0" smtClean="0"/>
+              <a:t>LDA variants using different sampling methods</a:t>
+            </a:r>
+            <a:endParaRPr lang="en-US" dirty="0" smtClean="0"/>
+          </a:p>
+          <a:p>
+            <a:pPr lvl="2"/>
+            <a:r>
+              <a:rPr lang="en-US" dirty="0" smtClean="0"/>
+              <a:t>Word2vec Deep learning</a:t>
+            </a:r>
+          </a:p>
+          <a:p>
+            <a:pPr lvl="2"/>
+            <a:r>
+              <a:rPr lang="en-US" dirty="0" smtClean="0"/>
+              <a:t>Word embedding</a:t>
+            </a:r>
+            <a:endParaRPr lang="en-US" dirty="0" smtClean="0"/>
+          </a:p>
+          <a:p>
+            <a:pPr lvl="1"/>
+            <a:r>
+              <a:rPr lang="en-US" dirty="0" err="1" smtClean="0"/>
+              <a:t>Gensim</a:t>
+            </a:r>
+            <a:r>
+              <a:rPr lang="en-US" dirty="0" smtClean="0"/>
+              <a:t> would make adding other capabilities easier</a:t>
+            </a:r>
+            <a:endParaRPr lang="en-US" dirty="0"/>
+          </a:p>
+          <a:p>
+            <a:r>
+              <a:rPr lang="en-US" dirty="0"/>
+              <a:t>Cons</a:t>
+            </a:r>
+          </a:p>
+          <a:p>
+            <a:pPr lvl="1"/>
+            <a:r>
+              <a:rPr lang="en-US" dirty="0" smtClean="0"/>
+              <a:t>Doesn’t natively support seeding of topics</a:t>
+            </a:r>
+          </a:p>
+          <a:p>
+            <a:pPr lvl="2"/>
+            <a:r>
+              <a:rPr lang="en-US" dirty="0" smtClean="0">
+                <a:solidFill>
+                  <a:srgbClr val="FF0000"/>
+                </a:solidFill>
+              </a:rPr>
+              <a:t>This is very important for our use case!!</a:t>
+            </a:r>
+          </a:p>
+          <a:p>
+            <a:pPr lvl="1"/>
+            <a:r>
+              <a:rPr lang="en-US" dirty="0" smtClean="0"/>
+              <a:t>Complex to use with high learning curve</a:t>
+            </a:r>
+            <a:endParaRPr lang="en-US" dirty="0"/>
+          </a:p>
+        </p:txBody>
+      </p:sp>
+    </p:spTree>
+    <p:extLst>
+      <p:ext uri="{BB962C8B-B14F-4D97-AF65-F5344CB8AC3E}">
+        <p14:creationId xmlns:p14="http://schemas.microsoft.com/office/powerpoint/2010/main" val="577500130"/>
+      </p:ext>
+    </p:extLst>
+  </p:cSld>
+  <p:clrMapOvr>
+    <a:masterClrMapping/>
+  </p:clrMapOvr>
+  <p:transition xmlns:p14="http://schemas.microsoft.com/office/powerpoint/2010/main">
+    <p:fade/>
+  </p:transition>
+  <p:timing>
+    <p:tnLst>
+      <p:par>
+        <p:cTn xmlns:p14="http://schemas.microsoft.com/office/powerpoint/2010/main" id="1" dur="indefinite" restart="never" nodeType="tmRoot"/>
+      </p:par>
+    </p:tnLst>
+  </p:timing>
+</p:sld>
+</file>
+
+<file path=ppt/slides/slide7.xml><?xml version="1.0" encoding="utf-8"?>
+<p:sld xmlns:a="http://schemas.openxmlformats.org/drawingml/2006/main" xmlns:r="http://schemas.openxmlformats.org/officeDocument/2006/relationships" xmlns:p="http://schemas.openxmlformats.org/presentationml/2006/main">
+  <p:cSld>
+    <p:spTree>
+      <p:nvGrpSpPr>
+        <p:cNvPr id="1" name=""/>
+        <p:cNvGrpSpPr/>
+        <p:nvPr/>
+      </p:nvGrpSpPr>
+      <p:grpSpPr>
+        <a:xfrm>
+          <a:off x="0" y="0"/>
+          <a:ext cx="0" cy="0"/>
+          <a:chOff x="0" y="0"/>
+          <a:chExt cx="0" cy="0"/>
+        </a:xfrm>
+      </p:grpSpPr>
+      <p:sp>
+        <p:nvSpPr>
+          <p:cNvPr id="2" name="Title 1">
+            <a:extLst>
+              <a:ext uri="{FF2B5EF4-FFF2-40B4-BE49-F238E27FC236}">
+                <a16:creationId xmlns="" xmlns:a16="http://schemas.microsoft.com/office/drawing/2014/main" id="{1C4D9048-0D5E-42BB-952A-048C2B8BB387}"/>
+              </a:ext>
+            </a:extLst>
+          </p:cNvPr>
+          <p:cNvSpPr>
+            <a:spLocks noGrp="1"/>
+          </p:cNvSpPr>
+          <p:nvPr>
+            <p:ph type="title"/>
+          </p:nvPr>
+        </p:nvSpPr>
+        <p:spPr/>
+        <p:txBody>
+          <a:bodyPr>
+            <a:normAutofit/>
+          </a:bodyPr>
+          <a:lstStyle/>
+          <a:p>
+            <a:r>
+              <a:rPr lang="en-US" dirty="0" smtClean="0"/>
+              <a:t>Our Pick</a:t>
+            </a:r>
+            <a:endParaRPr lang="en-US" sz="1400" dirty="0"/>
+          </a:p>
+        </p:txBody>
+      </p:sp>
+      <p:sp>
+        <p:nvSpPr>
+          <p:cNvPr id="3" name="Content Placeholder 2">
+            <a:extLst>
+              <a:ext uri="{FF2B5EF4-FFF2-40B4-BE49-F238E27FC236}">
+                <a16:creationId xmlns="" xmlns:a16="http://schemas.microsoft.com/office/drawing/2014/main" id="{EBA8AB48-5605-4ABB-B1B4-0EE94FAE3EB8}"/>
+              </a:ext>
+            </a:extLst>
+          </p:cNvPr>
+          <p:cNvSpPr txBox="1">
+            <a:spLocks/>
+          </p:cNvSpPr>
+          <p:nvPr/>
+        </p:nvSpPr>
+        <p:spPr>
+          <a:xfrm>
+            <a:off x="838200" y="859937"/>
+            <a:ext cx="10515600" cy="3810184"/>
+          </a:xfrm>
+          <a:prstGeom prst="rect">
+            <a:avLst/>
+          </a:prstGeom>
+        </p:spPr>
+        <p:txBody>
+          <a:bodyPr/>
+          <a:lstStyle>
+            <a:lvl1pPr marL="228600" indent="-228600" algn="l" defTabSz="914400" rtl="0" eaLnBrk="1" latinLnBrk="0" hangingPunct="1">
+              <a:lnSpc>
+                <a:spcPct val="90000"/>
+              </a:lnSpc>
+              <a:spcBef>
+                <a:spcPts val="1000"/>
+              </a:spcBef>
+              <a:buFont typeface="Arial" panose="020B0604020202020204" pitchFamily="34" charset="0"/>
+              <a:buChar char="•"/>
+              <a:defRPr sz="2800" kern="1200">
+                <a:solidFill>
+                  <a:schemeClr val="tx1"/>
+                </a:solidFill>
+                <a:latin typeface="+mn-lt"/>
+                <a:ea typeface="+mn-ea"/>
+                <a:cs typeface="+mn-cs"/>
+              </a:defRPr>
+            </a:lvl1pPr>
+            <a:lvl2pPr marL="685800" indent="-228600" algn="l" defTabSz="914400" rtl="0" eaLnBrk="1" latinLnBrk="0" hangingPunct="1">
+              <a:lnSpc>
+                <a:spcPct val="90000"/>
+              </a:lnSpc>
+              <a:spcBef>
+                <a:spcPts val="500"/>
+              </a:spcBef>
+              <a:buFont typeface="Arial" panose="020B0604020202020204" pitchFamily="34" charset="0"/>
+              <a:buChar char="•"/>
+              <a:defRPr sz="2400" kern="1200">
+                <a:solidFill>
+                  <a:schemeClr val="tx1"/>
+                </a:solidFill>
+                <a:latin typeface="+mn-lt"/>
+                <a:ea typeface="+mn-ea"/>
+                <a:cs typeface="+mn-cs"/>
+              </a:defRPr>
+            </a:lvl2pPr>
+            <a:lvl3pPr marL="1143000" indent="-228600" algn="l" defTabSz="914400" rtl="0" eaLnBrk="1" latinLnBrk="0" hangingPunct="1">
+              <a:lnSpc>
+                <a:spcPct val="90000"/>
+              </a:lnSpc>
+              <a:spcBef>
+                <a:spcPts val="500"/>
+              </a:spcBef>
+              <a:buFont typeface="Arial" panose="020B0604020202020204" pitchFamily="34" charset="0"/>
+              <a:buChar char="•"/>
+              <a:defRPr sz="2000" kern="1200">
+                <a:solidFill>
+                  <a:schemeClr val="tx1"/>
+                </a:solidFill>
+                <a:latin typeface="+mn-lt"/>
+                <a:ea typeface="+mn-ea"/>
+                <a:cs typeface="+mn-cs"/>
+              </a:defRPr>
+            </a:lvl3pPr>
+            <a:lvl4pPr marL="1600200" indent="-228600" algn="l" defTabSz="914400" rtl="0" eaLnBrk="1" latinLnBrk="0" hangingPunct="1">
+              <a:lnSpc>
+                <a:spcPct val="90000"/>
+              </a:lnSpc>
+              <a:spcBef>
+                <a:spcPts val="500"/>
+              </a:spcBef>
+              <a:buFont typeface="Arial" panose="020B0604020202020204" pitchFamily="34" charset="0"/>
+              <a:buChar char="•"/>
+              <a:defRPr sz="1800" kern="1200">
+                <a:solidFill>
+                  <a:schemeClr val="tx1"/>
+                </a:solidFill>
+                <a:latin typeface="+mn-lt"/>
+                <a:ea typeface="+mn-ea"/>
+                <a:cs typeface="+mn-cs"/>
+              </a:defRPr>
+            </a:lvl4pPr>
+            <a:lvl5pPr marL="2057400" indent="-228600" algn="l" defTabSz="914400" rtl="0" eaLnBrk="1" latinLnBrk="0" hangingPunct="1">
+              <a:lnSpc>
+                <a:spcPct val="90000"/>
+              </a:lnSpc>
+              <a:spcBef>
+                <a:spcPts val="500"/>
+              </a:spcBef>
+              <a:buFont typeface="Arial" panose="020B0604020202020204" pitchFamily="34" charset="0"/>
+              <a:buChar char="•"/>
+              <a:defRPr sz="1800" kern="1200">
+                <a:solidFill>
+                  <a:schemeClr val="tx1"/>
+                </a:solidFill>
+                <a:latin typeface="+mn-lt"/>
+                <a:ea typeface="+mn-ea"/>
+                <a:cs typeface="+mn-cs"/>
+              </a:defRPr>
+            </a:lvl5pPr>
+            <a:lvl6pPr marL="2514600" indent="-228600" algn="l" defTabSz="914400" rtl="0" eaLnBrk="1" latinLnBrk="0" hangingPunct="1">
+              <a:lnSpc>
+                <a:spcPct val="90000"/>
+              </a:lnSpc>
+              <a:spcBef>
+                <a:spcPts val="500"/>
+              </a:spcBef>
+              <a:buFont typeface="Arial" panose="020B0604020202020204" pitchFamily="34" charset="0"/>
+              <a:buChar char="•"/>
+              <a:defRPr sz="1800" kern="1200">
+                <a:solidFill>
+                  <a:schemeClr val="tx1"/>
+                </a:solidFill>
+                <a:latin typeface="+mn-lt"/>
+                <a:ea typeface="+mn-ea"/>
+                <a:cs typeface="+mn-cs"/>
+              </a:defRPr>
+            </a:lvl6pPr>
+            <a:lvl7pPr marL="2971800" indent="-228600" algn="l" defTabSz="914400" rtl="0" eaLnBrk="1" latinLnBrk="0" hangingPunct="1">
+              <a:lnSpc>
+                <a:spcPct val="90000"/>
+              </a:lnSpc>
+              <a:spcBef>
+                <a:spcPts val="500"/>
+              </a:spcBef>
+              <a:buFont typeface="Arial" panose="020B0604020202020204" pitchFamily="34" charset="0"/>
+              <a:buChar char="•"/>
+              <a:defRPr sz="1800" kern="1200">
+                <a:solidFill>
+                  <a:schemeClr val="tx1"/>
+                </a:solidFill>
+                <a:latin typeface="+mn-lt"/>
+                <a:ea typeface="+mn-ea"/>
+                <a:cs typeface="+mn-cs"/>
+              </a:defRPr>
+            </a:lvl7pPr>
+            <a:lvl8pPr marL="3429000" indent="-228600" algn="l" defTabSz="914400" rtl="0" eaLnBrk="1" latinLnBrk="0" hangingPunct="1">
+              <a:lnSpc>
+                <a:spcPct val="90000"/>
+              </a:lnSpc>
+              <a:spcBef>
+                <a:spcPts val="500"/>
+              </a:spcBef>
+              <a:buFont typeface="Arial" panose="020B0604020202020204" pitchFamily="34" charset="0"/>
+              <a:buChar char="•"/>
+              <a:defRPr sz="1800" kern="1200">
+                <a:solidFill>
+                  <a:schemeClr val="tx1"/>
+                </a:solidFill>
+                <a:latin typeface="+mn-lt"/>
+                <a:ea typeface="+mn-ea"/>
+                <a:cs typeface="+mn-cs"/>
+              </a:defRPr>
+            </a:lvl8pPr>
+            <a:lvl9pPr marL="3886200" indent="-228600" algn="l" defTabSz="914400" rtl="0" eaLnBrk="1" latinLnBrk="0" hangingPunct="1">
+              <a:lnSpc>
+                <a:spcPct val="90000"/>
+              </a:lnSpc>
+              <a:spcBef>
+                <a:spcPts val="500"/>
+              </a:spcBef>
+              <a:buFont typeface="Arial" panose="020B0604020202020204" pitchFamily="34" charset="0"/>
+              <a:buChar char="•"/>
+              <a:defRPr sz="1800" kern="1200">
+                <a:solidFill>
+                  <a:schemeClr val="tx1"/>
+                </a:solidFill>
+                <a:latin typeface="+mn-lt"/>
+                <a:ea typeface="+mn-ea"/>
+                <a:cs typeface="+mn-cs"/>
+              </a:defRPr>
+            </a:lvl9pPr>
+          </a:lstStyle>
+          <a:p>
+            <a:r>
+              <a:rPr lang="en-US" dirty="0"/>
+              <a:t>Solution = Guided LDA</a:t>
+            </a:r>
+          </a:p>
+          <a:p>
+            <a:pPr lvl="1"/>
+            <a:r>
+              <a:rPr lang="en-US" dirty="0" smtClean="0"/>
+              <a:t>Allows interpretable high level topics while doing more granular sub-topic modeling</a:t>
+            </a:r>
+          </a:p>
+          <a:p>
+            <a:pPr lvl="1"/>
+            <a:r>
+              <a:rPr lang="en-US" dirty="0" smtClean="0"/>
+              <a:t>Simple and easy to use, runs quick enough for our application</a:t>
+            </a:r>
+          </a:p>
+          <a:p>
+            <a:r>
+              <a:rPr lang="en-US" dirty="0" smtClean="0"/>
+              <a:t>Application</a:t>
+            </a:r>
+          </a:p>
+          <a:p>
+            <a:pPr lvl="1"/>
+            <a:r>
+              <a:rPr lang="en-US" dirty="0" smtClean="0"/>
+              <a:t>Model 1: Guided LDA for high-level topic modeling</a:t>
+            </a:r>
+          </a:p>
+          <a:p>
+            <a:pPr lvl="1"/>
+            <a:r>
+              <a:rPr lang="en-US" dirty="0" smtClean="0"/>
+              <a:t>Model 2: Regular LDA for lower-level topic modeling</a:t>
+            </a:r>
+          </a:p>
+          <a:p>
+            <a:pPr lvl="1"/>
+            <a:r>
+              <a:rPr lang="en-US" dirty="0" smtClean="0"/>
+              <a:t>Both are used in our recommender system and visualization output</a:t>
+            </a:r>
+          </a:p>
+          <a:p>
+            <a:pPr lvl="1"/>
+            <a:endParaRPr lang="en-US" dirty="0"/>
+          </a:p>
+          <a:p>
+            <a:pPr marL="0" indent="0">
+              <a:buNone/>
+            </a:pPr>
+            <a:endParaRPr lang="en-US" dirty="0"/>
+          </a:p>
+        </p:txBody>
+      </p:sp>
+      <p:pic>
+        <p:nvPicPr>
+          <p:cNvPr id="6" name="Picture 5" descr="Screen Shot 2018-05-08 at 6.58.08 PM.png"/>
+          <p:cNvPicPr>
+            <a:picLocks noChangeAspect="1"/>
+          </p:cNvPicPr>
+          <p:nvPr/>
+        </p:nvPicPr>
+        <p:blipFill>
+          <a:blip r:embed="rId3">
+            <a:extLst>
+              <a:ext uri="{28A0092B-C50C-407E-A947-70E740481C1C}">
+                <a14:useLocalDpi xmlns:a14="http://schemas.microsoft.com/office/drawing/2010/main" val="0"/>
+              </a:ext>
+            </a:extLst>
+          </a:blip>
+          <a:stretch>
+            <a:fillRect/>
+          </a:stretch>
+        </p:blipFill>
+        <p:spPr>
+          <a:xfrm>
+            <a:off x="217859" y="4286457"/>
+            <a:ext cx="9311192" cy="2315216"/>
+          </a:xfrm>
+          <a:prstGeom prst="rect">
+            <a:avLst/>
+          </a:prstGeom>
+        </p:spPr>
+      </p:pic>
+    </p:spTree>
+    <p:extLst>
+      <p:ext uri="{BB962C8B-B14F-4D97-AF65-F5344CB8AC3E}">
+        <p14:creationId xmlns:p14="http://schemas.microsoft.com/office/powerpoint/2010/main" val="577500130"/>
       </p:ext>
     </p:extLst>
   </p:cSld>

</xml_diff>